<commit_message>
Add figures in discussion
</commit_message>
<xml_diff>
--- a/poster.pptx
+++ b/poster.pptx
@@ -147,284 +147,6 @@
     </p:ext>
   </p:extLst>
 </p:presentation>
-</file>
-
-<file path=ppt/charts/chart1.xml><?xml version="1.0" encoding="utf-8"?>
-<c:chartSpace xmlns:c="http://schemas.openxmlformats.org/drawingml/2006/chart" xmlns:a="http://schemas.openxmlformats.org/drawingml/2006/main" xmlns:r="http://schemas.openxmlformats.org/officeDocument/2006/relationships" xmlns:c16r2="http://schemas.microsoft.com/office/drawing/2015/06/chart">
-  <c:date1904 val="0"/>
-  <c:lang val="en-US"/>
-  <c:roundedCorners val="0"/>
-  <mc:AlternateContent xmlns:mc="http://schemas.openxmlformats.org/markup-compatibility/2006">
-    <mc:Choice xmlns:c14="http://schemas.microsoft.com/office/drawing/2007/8/2/chart" Requires="c14">
-      <c14:style val="103"/>
-    </mc:Choice>
-    <mc:Fallback>
-      <c:style val="3"/>
-    </mc:Fallback>
-  </mc:AlternateContent>
-  <c:chart>
-    <c:autoTitleDeleted val="0"/>
-    <c:plotArea>
-      <c:layout/>
-      <c:barChart>
-        <c:barDir val="col"/>
-        <c:grouping val="clustered"/>
-        <c:varyColors val="0"/>
-        <c:ser>
-          <c:idx val="0"/>
-          <c:order val="0"/>
-          <c:tx>
-            <c:strRef>
-              <c:f>Sheet1!$B$1</c:f>
-              <c:strCache>
-                <c:ptCount val="1"/>
-                <c:pt idx="0">
-                  <c:v>Series 1</c:v>
-                </c:pt>
-              </c:strCache>
-            </c:strRef>
-          </c:tx>
-          <c:invertIfNegative val="0"/>
-          <c:cat>
-            <c:strRef>
-              <c:f>Sheet1!$A$2:$A$5</c:f>
-              <c:strCache>
-                <c:ptCount val="4"/>
-                <c:pt idx="0">
-                  <c:v>Category 1</c:v>
-                </c:pt>
-                <c:pt idx="1">
-                  <c:v>Category 2</c:v>
-                </c:pt>
-                <c:pt idx="2">
-                  <c:v>Category 3</c:v>
-                </c:pt>
-                <c:pt idx="3">
-                  <c:v>Category 4</c:v>
-                </c:pt>
-              </c:strCache>
-            </c:strRef>
-          </c:cat>
-          <c:val>
-            <c:numRef>
-              <c:f>Sheet1!$B$2:$B$5</c:f>
-              <c:numCache>
-                <c:formatCode>General</c:formatCode>
-                <c:ptCount val="4"/>
-                <c:pt idx="0">
-                  <c:v>4.3</c:v>
-                </c:pt>
-                <c:pt idx="1">
-                  <c:v>2.5</c:v>
-                </c:pt>
-                <c:pt idx="2">
-                  <c:v>3.5</c:v>
-                </c:pt>
-                <c:pt idx="3">
-                  <c:v>4.5</c:v>
-                </c:pt>
-              </c:numCache>
-            </c:numRef>
-          </c:val>
-          <c:extLst>
-            <c:ext xmlns:c16="http://schemas.microsoft.com/office/drawing/2014/chart" uri="{C3380CC4-5D6E-409C-BE32-E72D297353CC}">
-              <c16:uniqueId val="{00000000-6706-466A-BB58-8473F3647CA6}"/>
-            </c:ext>
-          </c:extLst>
-        </c:ser>
-        <c:ser>
-          <c:idx val="1"/>
-          <c:order val="1"/>
-          <c:tx>
-            <c:strRef>
-              <c:f>Sheet1!$C$1</c:f>
-              <c:strCache>
-                <c:ptCount val="1"/>
-                <c:pt idx="0">
-                  <c:v>Series 2</c:v>
-                </c:pt>
-              </c:strCache>
-            </c:strRef>
-          </c:tx>
-          <c:invertIfNegative val="0"/>
-          <c:cat>
-            <c:strRef>
-              <c:f>Sheet1!$A$2:$A$5</c:f>
-              <c:strCache>
-                <c:ptCount val="4"/>
-                <c:pt idx="0">
-                  <c:v>Category 1</c:v>
-                </c:pt>
-                <c:pt idx="1">
-                  <c:v>Category 2</c:v>
-                </c:pt>
-                <c:pt idx="2">
-                  <c:v>Category 3</c:v>
-                </c:pt>
-                <c:pt idx="3">
-                  <c:v>Category 4</c:v>
-                </c:pt>
-              </c:strCache>
-            </c:strRef>
-          </c:cat>
-          <c:val>
-            <c:numRef>
-              <c:f>Sheet1!$C$2:$C$5</c:f>
-              <c:numCache>
-                <c:formatCode>General</c:formatCode>
-                <c:ptCount val="4"/>
-                <c:pt idx="0">
-                  <c:v>2.4</c:v>
-                </c:pt>
-                <c:pt idx="1">
-                  <c:v>4.4000000000000004</c:v>
-                </c:pt>
-                <c:pt idx="2">
-                  <c:v>1.8</c:v>
-                </c:pt>
-                <c:pt idx="3">
-                  <c:v>2.8</c:v>
-                </c:pt>
-              </c:numCache>
-            </c:numRef>
-          </c:val>
-          <c:extLst>
-            <c:ext xmlns:c16="http://schemas.microsoft.com/office/drawing/2014/chart" uri="{C3380CC4-5D6E-409C-BE32-E72D297353CC}">
-              <c16:uniqueId val="{00000001-6706-466A-BB58-8473F3647CA6}"/>
-            </c:ext>
-          </c:extLst>
-        </c:ser>
-        <c:ser>
-          <c:idx val="2"/>
-          <c:order val="2"/>
-          <c:tx>
-            <c:strRef>
-              <c:f>Sheet1!$D$1</c:f>
-              <c:strCache>
-                <c:ptCount val="1"/>
-                <c:pt idx="0">
-                  <c:v>Series 3</c:v>
-                </c:pt>
-              </c:strCache>
-            </c:strRef>
-          </c:tx>
-          <c:invertIfNegative val="0"/>
-          <c:cat>
-            <c:strRef>
-              <c:f>Sheet1!$A$2:$A$5</c:f>
-              <c:strCache>
-                <c:ptCount val="4"/>
-                <c:pt idx="0">
-                  <c:v>Category 1</c:v>
-                </c:pt>
-                <c:pt idx="1">
-                  <c:v>Category 2</c:v>
-                </c:pt>
-                <c:pt idx="2">
-                  <c:v>Category 3</c:v>
-                </c:pt>
-                <c:pt idx="3">
-                  <c:v>Category 4</c:v>
-                </c:pt>
-              </c:strCache>
-            </c:strRef>
-          </c:cat>
-          <c:val>
-            <c:numRef>
-              <c:f>Sheet1!$D$2:$D$5</c:f>
-              <c:numCache>
-                <c:formatCode>General</c:formatCode>
-                <c:ptCount val="4"/>
-                <c:pt idx="0">
-                  <c:v>2</c:v>
-                </c:pt>
-                <c:pt idx="1">
-                  <c:v>2</c:v>
-                </c:pt>
-                <c:pt idx="2">
-                  <c:v>3</c:v>
-                </c:pt>
-                <c:pt idx="3">
-                  <c:v>3.4</c:v>
-                </c:pt>
-              </c:numCache>
-            </c:numRef>
-          </c:val>
-          <c:extLst>
-            <c:ext xmlns:c16="http://schemas.microsoft.com/office/drawing/2014/chart" uri="{C3380CC4-5D6E-409C-BE32-E72D297353CC}">
-              <c16:uniqueId val="{00000002-6706-466A-BB58-8473F3647CA6}"/>
-            </c:ext>
-          </c:extLst>
-        </c:ser>
-        <c:dLbls>
-          <c:showLegendKey val="0"/>
-          <c:showVal val="0"/>
-          <c:showCatName val="0"/>
-          <c:showSerName val="0"/>
-          <c:showPercent val="0"/>
-          <c:showBubbleSize val="0"/>
-        </c:dLbls>
-        <c:gapWidth val="150"/>
-        <c:axId val="89868544"/>
-        <c:axId val="89870336"/>
-      </c:barChart>
-      <c:catAx>
-        <c:axId val="89868544"/>
-        <c:scaling>
-          <c:orientation val="minMax"/>
-        </c:scaling>
-        <c:delete val="0"/>
-        <c:axPos val="b"/>
-        <c:numFmt formatCode="General" sourceLinked="0"/>
-        <c:majorTickMark val="out"/>
-        <c:minorTickMark val="none"/>
-        <c:tickLblPos val="nextTo"/>
-        <c:crossAx val="89870336"/>
-        <c:crosses val="autoZero"/>
-        <c:auto val="1"/>
-        <c:lblAlgn val="ctr"/>
-        <c:lblOffset val="100"/>
-        <c:noMultiLvlLbl val="0"/>
-      </c:catAx>
-      <c:valAx>
-        <c:axId val="89870336"/>
-        <c:scaling>
-          <c:orientation val="minMax"/>
-        </c:scaling>
-        <c:delete val="0"/>
-        <c:axPos val="l"/>
-        <c:majorGridlines/>
-        <c:numFmt formatCode="General" sourceLinked="1"/>
-        <c:majorTickMark val="out"/>
-        <c:minorTickMark val="none"/>
-        <c:tickLblPos val="nextTo"/>
-        <c:crossAx val="89868544"/>
-        <c:crosses val="autoZero"/>
-        <c:crossBetween val="between"/>
-      </c:valAx>
-    </c:plotArea>
-    <c:legend>
-      <c:legendPos val="r"/>
-      <c:overlay val="0"/>
-    </c:legend>
-    <c:plotVisOnly val="1"/>
-    <c:dispBlanksAs val="gap"/>
-    <c:showDLblsOverMax val="0"/>
-  </c:chart>
-  <c:txPr>
-    <a:bodyPr/>
-    <a:lstStyle/>
-    <a:p>
-      <a:pPr>
-        <a:defRPr sz="1800"/>
-      </a:pPr>
-      <a:endParaRPr lang="en-US"/>
-    </a:p>
-  </c:txPr>
-  <c:externalData r:id="rId1">
-    <c:autoUpdate val="0"/>
-  </c:externalData>
-</c:chartSpace>
 </file>
 
 <file path=ppt/handoutMasters/handoutMaster1.xml><?xml version="1.0" encoding="utf-8"?>
@@ -2740,6 +2462,64 @@
           <a:chExt cx="0" cy="0"/>
         </a:xfrm>
       </p:grpSpPr>
+      <p:pic>
+        <p:nvPicPr>
+          <p:cNvPr id="9" name="Picture 8"/>
+          <p:cNvPicPr>
+            <a:picLocks noChangeAspect="1"/>
+          </p:cNvPicPr>
+          <p:nvPr/>
+        </p:nvPicPr>
+        <p:blipFill rotWithShape="1">
+          <a:blip r:embed="rId2">
+            <a:extLst>
+              <a:ext uri="{28A0092B-C50C-407E-A947-70E740481C1C}">
+                <a14:useLocalDpi xmlns:a14="http://schemas.microsoft.com/office/drawing/2010/main" val="0"/>
+              </a:ext>
+            </a:extLst>
+          </a:blip>
+          <a:srcRect t="-3406" b="5022"/>
+          <a:stretch/>
+        </p:blipFill>
+        <p:spPr>
+          <a:xfrm>
+            <a:off x="22440651" y="7145724"/>
+            <a:ext cx="9144000" cy="3598476"/>
+          </a:xfrm>
+          <a:prstGeom prst="rect">
+            <a:avLst/>
+          </a:prstGeom>
+        </p:spPr>
+      </p:pic>
+      <p:pic>
+        <p:nvPicPr>
+          <p:cNvPr id="8" name="Picture 7"/>
+          <p:cNvPicPr>
+            <a:picLocks noChangeAspect="1"/>
+          </p:cNvPicPr>
+          <p:nvPr/>
+        </p:nvPicPr>
+        <p:blipFill rotWithShape="1">
+          <a:blip r:embed="rId3">
+            <a:extLst>
+              <a:ext uri="{28A0092B-C50C-407E-A947-70E740481C1C}">
+                <a14:useLocalDpi xmlns:a14="http://schemas.microsoft.com/office/drawing/2010/main" val="0"/>
+              </a:ext>
+            </a:extLst>
+          </a:blip>
+          <a:srcRect b="4195"/>
+          <a:stretch/>
+        </p:blipFill>
+        <p:spPr>
+          <a:xfrm>
+            <a:off x="22440633" y="10669040"/>
+            <a:ext cx="9144018" cy="3504160"/>
+          </a:xfrm>
+          <a:prstGeom prst="rect">
+            <a:avLst/>
+          </a:prstGeom>
+        </p:spPr>
+      </p:pic>
       <p:sp>
         <p:nvSpPr>
           <p:cNvPr id="30" name="Text Box 191"/>
@@ -2751,7 +2531,7 @@
         <p:spPr bwMode="auto">
           <a:xfrm>
             <a:off x="22074882" y="3657600"/>
-            <a:ext cx="9875520" cy="2044456"/>
+            <a:ext cx="9875520" cy="3583339"/>
           </a:xfrm>
           <a:prstGeom prst="rect">
             <a:avLst/>
@@ -2899,17 +2679,59 @@
           </a:p>
           <a:p>
             <a:pPr eaLnBrk="1" hangingPunct="1"/>
+            <a:r>
+              <a:rPr lang="en-US" sz="2000" b="1" dirty="0">
+                <a:latin typeface="Calibri" pitchFamily="34" charset="0"/>
+              </a:rPr>
+              <a:t>FILLER</a:t>
+            </a:r>
+          </a:p>
+          <a:p>
+            <a:pPr eaLnBrk="1" hangingPunct="1"/>
+            <a:r>
+              <a:rPr lang="en-US" sz="2000" b="1" dirty="0">
+                <a:latin typeface="Calibri" pitchFamily="34" charset="0"/>
+              </a:rPr>
+              <a:t>FILLER</a:t>
+            </a:r>
+          </a:p>
+          <a:p>
+            <a:pPr eaLnBrk="1" hangingPunct="1"/>
+            <a:r>
+              <a:rPr lang="en-US" sz="2000" b="1" dirty="0">
+                <a:latin typeface="Calibri" pitchFamily="34" charset="0"/>
+              </a:rPr>
+              <a:t>FILLER</a:t>
+            </a:r>
+          </a:p>
+          <a:p>
+            <a:pPr eaLnBrk="1" hangingPunct="1"/>
+            <a:r>
+              <a:rPr lang="en-US" sz="2000" b="1" dirty="0">
+                <a:latin typeface="Calibri" pitchFamily="34" charset="0"/>
+              </a:rPr>
+              <a:t>FILLER</a:t>
+            </a:r>
+          </a:p>
+          <a:p>
+            <a:pPr eaLnBrk="1" hangingPunct="1"/>
             <a:endParaRPr lang="en-US" sz="2000" b="1" dirty="0">
               <a:latin typeface="Calibri" pitchFamily="34" charset="0"/>
             </a:endParaRPr>
           </a:p>
           <a:p>
             <a:pPr eaLnBrk="1" hangingPunct="1"/>
+            <a:endParaRPr lang="en-US" sz="2000" b="1" dirty="0">
+              <a:latin typeface="Calibri" pitchFamily="34" charset="0"/>
+            </a:endParaRPr>
+          </a:p>
+          <a:p>
+            <a:pPr eaLnBrk="1" hangingPunct="1"/>
             <a:r>
               <a:rPr lang="en-US" sz="2000" dirty="0">
                 <a:latin typeface="Calibri" pitchFamily="34" charset="0"/>
               </a:rPr>
-              <a:t>Figures 3 and 4 show the results of </a:t>
+              <a:t>Figure 3 shows the </a:t>
             </a:r>
             <a:r>
               <a:rPr lang="en-US" sz="2000" dirty="0" err="1">
@@ -2921,19 +2743,7 @@
               <a:rPr lang="en-US" sz="2000" dirty="0">
                 <a:latin typeface="Calibri" pitchFamily="34" charset="0"/>
               </a:rPr>
-              <a:t> on “Call Me Maybe” (Carly Rae Jepsen) and “Titanium” (David Guetta ft. </a:t>
-            </a:r>
-            <a:r>
-              <a:rPr lang="en-US" sz="2000" dirty="0" err="1">
-                <a:latin typeface="Calibri" pitchFamily="34" charset="0"/>
-              </a:rPr>
-              <a:t>Sia</a:t>
-            </a:r>
-            <a:r>
-              <a:rPr lang="en-US" sz="2000" dirty="0">
-                <a:latin typeface="Calibri" pitchFamily="34" charset="0"/>
-              </a:rPr>
-              <a:t>).</a:t>
+              <a:t> segmentation of “Call Me Maybe” and includes the correct segmentation for comparison.</a:t>
             </a:r>
           </a:p>
         </p:txBody>
@@ -3561,7 +3371,7 @@
         <p:spPr>
           <a:xfrm>
             <a:off x="1200337" y="20025359"/>
-            <a:ext cx="12287063" cy="1280556"/>
+            <a:ext cx="12287063" cy="1588333"/>
           </a:xfrm>
           <a:prstGeom prst="rect">
             <a:avLst/>
@@ -3610,6 +3420,9 @@
               <a:rPr lang="en-US" sz="2000" dirty="0"/>
               <a:t>Northwestern University</a:t>
             </a:r>
+          </a:p>
+          <a:p>
+            <a:endParaRPr lang="en-US" sz="2000" dirty="0"/>
           </a:p>
           <a:p>
             <a:r>
@@ -3681,15 +3494,15 @@
               <a:buAutoNum type="arabicPeriod"/>
             </a:pPr>
             <a:r>
-              <a:rPr lang="en-US" sz="2400" dirty="0"/>
+              <a:rPr lang="en-US" sz="2000" dirty="0"/>
               <a:t>Jensen, </a:t>
             </a:r>
             <a:r>
-              <a:rPr lang="en-US" sz="2400" dirty="0" err="1"/>
+              <a:rPr lang="en-US" sz="2000" dirty="0" err="1"/>
               <a:t>Kristoffer</a:t>
             </a:r>
             <a:r>
-              <a:rPr lang="en-US" sz="2400" dirty="0"/>
+              <a:rPr lang="en-US" sz="2000" dirty="0"/>
               <a:t>. "Multiple scale music segmentation using rhythm, timbre, and harmony." EURASIP Journal on Applied Signal Processing 2007.1 (2007): 159-159.</a:t>
             </a:r>
           </a:p>
@@ -3699,21 +3512,36 @@
               <a:buAutoNum type="arabicPeriod"/>
             </a:pPr>
             <a:r>
-              <a:rPr lang="en-US" sz="2400" dirty="0" err="1"/>
+              <a:rPr lang="en-US" sz="2000" dirty="0" err="1"/>
               <a:t>Couvreur</a:t>
             </a:r>
             <a:r>
-              <a:rPr lang="en-US" sz="2400" dirty="0"/>
+              <a:rPr lang="en-US" sz="2000" dirty="0"/>
               <a:t>, Laurent, et al. "Audio thumbnailing." QPSR of the </a:t>
             </a:r>
             <a:r>
-              <a:rPr lang="en-US" sz="2400" dirty="0" err="1"/>
+              <a:rPr lang="en-US" sz="2000" dirty="0" err="1"/>
               <a:t>numediart</a:t>
             </a:r>
             <a:r>
-              <a:rPr lang="en-US" sz="2400" dirty="0"/>
+              <a:rPr lang="en-US" sz="2000" dirty="0"/>
               <a:t> research program 1 (2008): 67-85.</a:t>
             </a:r>
+          </a:p>
+          <a:p>
+            <a:pPr marL="244855" indent="-244855">
+              <a:buFont typeface="+mj-lt"/>
+              <a:buAutoNum type="arabicPeriod"/>
+            </a:pPr>
+            <a:r>
+              <a:rPr lang="en-US" sz="2000" dirty="0" err="1"/>
+              <a:t>McFee</a:t>
+            </a:r>
+            <a:r>
+              <a:rPr lang="en-US" sz="2000" dirty="0"/>
+              <a:t>, Brian, and Dan Ellis. "Analyzing Song Structure with Spectral Clustering." ISMIR. 2014.</a:t>
+            </a:r>
+            <a:endParaRPr lang="en-US" sz="2000" dirty="0"/>
           </a:p>
         </p:txBody>
       </p:sp>
@@ -4718,7 +4546,7 @@
                 <a:avLst/>
               </a:prstGeom>
               <a:blipFill>
-                <a:blip r:embed="rId2"/>
+                <a:blip r:embed="rId4"/>
                 <a:stretch>
                   <a:fillRect l="-493" b="-136"/>
                 </a:stretch>
@@ -4813,8 +4641,8 @@
         </p:nvSpPr>
         <p:spPr bwMode="auto">
           <a:xfrm>
-            <a:off x="21945600" y="14173201"/>
-            <a:ext cx="9875520" cy="505573"/>
+            <a:off x="21945600" y="15011401"/>
+            <a:ext cx="9875520" cy="3583339"/>
           </a:xfrm>
           <a:prstGeom prst="rect">
             <a:avLst/>
@@ -4947,6 +4775,90 @@
               </a:rPr>
               <a:t> showed extremely promising results, as it was frequently able to identify </a:t>
             </a:r>
+            <a:r>
+              <a:rPr lang="en-US" sz="2000" b="1" dirty="0">
+                <a:latin typeface="Calibri" pitchFamily="34" charset="0"/>
+              </a:rPr>
+              <a:t>things it was able to do. </a:t>
+            </a:r>
+            <a:r>
+              <a:rPr lang="en-US" sz="2000" dirty="0">
+                <a:latin typeface="Calibri" pitchFamily="34" charset="0"/>
+              </a:rPr>
+              <a:t>In addition, it correctly </a:t>
+            </a:r>
+            <a:r>
+              <a:rPr lang="en-US" sz="2000" b="1" dirty="0">
+                <a:latin typeface="Calibri" pitchFamily="34" charset="0"/>
+              </a:rPr>
+              <a:t>did another thing. Maybe another line. </a:t>
+            </a:r>
+          </a:p>
+          <a:p>
+            <a:pPr eaLnBrk="1" hangingPunct="1"/>
+            <a:r>
+              <a:rPr lang="en-US" sz="2000" b="1" dirty="0">
+                <a:latin typeface="Calibri" pitchFamily="34" charset="0"/>
+              </a:rPr>
+              <a:t>FILLER</a:t>
+            </a:r>
+          </a:p>
+          <a:p>
+            <a:pPr eaLnBrk="1" hangingPunct="1"/>
+            <a:r>
+              <a:rPr lang="en-US" sz="2000" b="1" dirty="0">
+                <a:latin typeface="Calibri" pitchFamily="34" charset="0"/>
+              </a:rPr>
+              <a:t>FILLER</a:t>
+            </a:r>
+          </a:p>
+          <a:p>
+            <a:pPr eaLnBrk="1" hangingPunct="1"/>
+            <a:r>
+              <a:rPr lang="en-US" sz="2000" dirty="0">
+                <a:latin typeface="Calibri" pitchFamily="34" charset="0"/>
+              </a:rPr>
+              <a:t>While song segmentation is a difficult task, </a:t>
+            </a:r>
+            <a:r>
+              <a:rPr lang="en-US" sz="2000" dirty="0" err="1">
+                <a:latin typeface="Calibri" pitchFamily="34" charset="0"/>
+              </a:rPr>
+              <a:t>Structify</a:t>
+            </a:r>
+            <a:r>
+              <a:rPr lang="en-US" sz="2000" dirty="0">
+                <a:latin typeface="Calibri" pitchFamily="34" charset="0"/>
+              </a:rPr>
+              <a:t> works well on a variety of pop songs.</a:t>
+            </a:r>
+          </a:p>
+          <a:p>
+            <a:pPr eaLnBrk="1" hangingPunct="1"/>
+            <a:endParaRPr lang="en-US" sz="2000" dirty="0">
+              <a:latin typeface="Calibri" pitchFamily="34" charset="0"/>
+            </a:endParaRPr>
+          </a:p>
+          <a:p>
+            <a:pPr eaLnBrk="1" hangingPunct="1"/>
+            <a:r>
+              <a:rPr lang="en-US" sz="2000" dirty="0">
+                <a:latin typeface="Calibri" pitchFamily="34" charset="0"/>
+              </a:rPr>
+              <a:t>This project can be taken in several directions. The segmentation pipeline could likely be fine-tuned, as the original authors were able to obtain better results than we were. Other methods of segmentation could also be investigated, such as analysis with spectral clustering</a:t>
+            </a:r>
+            <a:r>
+              <a:rPr lang="en-US" sz="2000" baseline="30000" dirty="0">
+                <a:latin typeface="Calibri" pitchFamily="34" charset="0"/>
+              </a:rPr>
+              <a:t>3</a:t>
+            </a:r>
+            <a:r>
+              <a:rPr lang="en-US" sz="2000" dirty="0">
+                <a:latin typeface="Calibri" pitchFamily="34" charset="0"/>
+              </a:rPr>
+              <a:t>. Finally, we originally wanted to label sections (as “intro,” “verse,” etc.), but decided that this was out of scope; this is yet another path forward.</a:t>
+            </a:r>
           </a:p>
         </p:txBody>
       </p:sp>
@@ -4958,7 +4870,7 @@
         </p:nvSpPr>
         <p:spPr>
           <a:xfrm>
-            <a:off x="21945600" y="13716000"/>
+            <a:off x="21945600" y="14554200"/>
             <a:ext cx="9875520" cy="457200"/>
           </a:xfrm>
           <a:prstGeom prst="rect">
@@ -6742,28 +6654,6 @@
           </a:p>
         </p:txBody>
       </p:sp>
-      <p:graphicFrame>
-        <p:nvGraphicFramePr>
-          <p:cNvPr id="3" name="Chart 2"/>
-          <p:cNvGraphicFramePr/>
-          <p:nvPr>
-            <p:extLst>
-              <p:ext uri="{D42A27DB-BD31-4B8C-83A1-F6EECF244321}">
-                <p14:modId xmlns:p14="http://schemas.microsoft.com/office/powerpoint/2010/main" val="2055249375"/>
-              </p:ext>
-            </p:extLst>
-          </p:nvPr>
-        </p:nvGraphicFramePr>
-        <p:xfrm>
-          <a:off x="22387043" y="8717350"/>
-          <a:ext cx="9563359" cy="4141705"/>
-        </p:xfrm>
-        <a:graphic>
-          <a:graphicData uri="http://schemas.openxmlformats.org/drawingml/2006/chart">
-            <c:chart xmlns:c="http://schemas.openxmlformats.org/drawingml/2006/chart" xmlns:r="http://schemas.openxmlformats.org/officeDocument/2006/relationships" r:id="rId3"/>
-          </a:graphicData>
-        </a:graphic>
-      </p:graphicFrame>
       <p:sp>
         <p:nvSpPr>
           <p:cNvPr id="37" name="Text Box 180"/>
@@ -6774,8 +6664,8 @@
         </p:nvSpPr>
         <p:spPr bwMode="auto">
           <a:xfrm>
-            <a:off x="25628099" y="12868345"/>
-            <a:ext cx="2510521" cy="295671"/>
+            <a:off x="23391974" y="14193663"/>
+            <a:ext cx="7241367" cy="295671"/>
           </a:xfrm>
           <a:prstGeom prst="rect">
             <a:avLst/>
@@ -6922,13 +6812,19 @@
               <a:rPr lang="en-US" sz="1600" b="1" dirty="0">
                 <a:latin typeface="Calibri" pitchFamily="34" charset="0"/>
               </a:rPr>
-              <a:t>Chart 1.</a:t>
+              <a:t>Figure 3a, b: </a:t>
+            </a:r>
+            <a:r>
+              <a:rPr lang="en-US" sz="1600" dirty="0" err="1">
+                <a:latin typeface="Calibri" pitchFamily="34" charset="0"/>
+              </a:rPr>
+              <a:t>Structify</a:t>
             </a:r>
             <a:r>
               <a:rPr lang="en-US" sz="1600" dirty="0">
                 <a:latin typeface="Calibri" pitchFamily="34" charset="0"/>
               </a:rPr>
-              <a:t> Label in 16pt Calibri.</a:t>
+              <a:t> (top) and manual (bottom) segmentations of “Call Me Maybe”</a:t>
             </a:r>
           </a:p>
         </p:txBody>
@@ -6942,7 +6838,7 @@
           <p:nvPr/>
         </p:nvPicPr>
         <p:blipFill rotWithShape="1">
-          <a:blip r:embed="rId4">
+          <a:blip r:embed="rId5">
             <a:extLst>
               <a:ext uri="{28A0092B-C50C-407E-A947-70E740481C1C}">
                 <a14:useLocalDpi xmlns:a14="http://schemas.microsoft.com/office/drawing/2010/main" val="0"/>
@@ -6981,7 +6877,7 @@
           <p:nvPr/>
         </p:nvPicPr>
         <p:blipFill rotWithShape="1">
-          <a:blip r:embed="rId5">
+          <a:blip r:embed="rId6">
             <a:extLst>
               <a:ext uri="{28A0092B-C50C-407E-A947-70E740481C1C}">
                 <a14:useLocalDpi xmlns:a14="http://schemas.microsoft.com/office/drawing/2010/main" val="0"/>
@@ -7010,7 +6906,7 @@
           <p:nvPr/>
         </p:nvPicPr>
         <p:blipFill rotWithShape="1">
-          <a:blip r:embed="rId6">
+          <a:blip r:embed="rId7">
             <a:extLst>
               <a:ext uri="{28A0092B-C50C-407E-A947-70E740481C1C}">
                 <a14:useLocalDpi xmlns:a14="http://schemas.microsoft.com/office/drawing/2010/main" val="0"/>

</xml_diff>

<commit_message>
Write skeleton of discussion
</commit_message>
<xml_diff>
--- a/poster.pptx
+++ b/poster.pptx
@@ -2483,7 +2483,7 @@
         </p:blipFill>
         <p:spPr>
           <a:xfrm>
-            <a:off x="22440651" y="7145724"/>
+            <a:off x="22440651" y="7086600"/>
             <a:ext cx="9144000" cy="3598476"/>
           </a:xfrm>
           <a:prstGeom prst="rect">
@@ -2507,13 +2507,13 @@
               </a:ext>
             </a:extLst>
           </a:blip>
-          <a:srcRect b="4195"/>
+          <a:srcRect t="2201" b="4195"/>
           <a:stretch/>
         </p:blipFill>
         <p:spPr>
           <a:xfrm>
-            <a:off x="22440633" y="10669040"/>
-            <a:ext cx="9144018" cy="3504160"/>
+            <a:off x="22440633" y="10749526"/>
+            <a:ext cx="9144018" cy="3423674"/>
           </a:xfrm>
           <a:prstGeom prst="rect">
             <a:avLst/>

</xml_diff>

<commit_message>
Finish discussion and conclusions
</commit_message>
<xml_diff>
--- a/poster.pptx
+++ b/poster.pptx
@@ -2483,8 +2483,8 @@
         </p:blipFill>
         <p:spPr>
           <a:xfrm>
-            <a:off x="22440651" y="7086600"/>
-            <a:ext cx="9144000" cy="3598476"/>
+            <a:off x="22860000" y="7629118"/>
+            <a:ext cx="8496549" cy="3343682"/>
           </a:xfrm>
           <a:prstGeom prst="rect">
             <a:avLst/>
@@ -2512,8 +2512,8 @@
         </p:blipFill>
         <p:spPr>
           <a:xfrm>
-            <a:off x="22440633" y="10749526"/>
-            <a:ext cx="9144018" cy="3423674"/>
+            <a:off x="22859982" y="10977769"/>
+            <a:ext cx="8496566" cy="3181257"/>
           </a:xfrm>
           <a:prstGeom prst="rect">
             <a:avLst/>
@@ -2531,7 +2531,7 @@
         <p:spPr bwMode="auto">
           <a:xfrm>
             <a:off x="22074882" y="3657600"/>
-            <a:ext cx="9875520" cy="3583339"/>
+            <a:ext cx="9875520" cy="4198892"/>
           </a:xfrm>
           <a:prstGeom prst="rect">
             <a:avLst/>
@@ -2668,60 +2668,87 @@
               <a:rPr lang="en-US" sz="2000" dirty="0">
                 <a:latin typeface="Calibri" pitchFamily="34" charset="0"/>
               </a:rPr>
-              <a:t> works reasonably well. Some notable results include accurately identifying the start of the chorus of “Call Me Maybe” each time it occurred, and </a:t>
-            </a:r>
-            <a:r>
-              <a:rPr lang="en-US" sz="2000" b="1" dirty="0">
-                <a:latin typeface="Calibri" pitchFamily="34" charset="0"/>
-              </a:rPr>
-              <a:t>ADD MORE THINGS THAT THIS DOES</a:t>
+              <a:t> works reasonably well. On “Call Me Maybe,” </a:t>
+            </a:r>
+            <a:r>
+              <a:rPr lang="en-US" sz="2000" dirty="0" err="1">
+                <a:latin typeface="Calibri" pitchFamily="34" charset="0"/>
+              </a:rPr>
+              <a:t>Structify</a:t>
+            </a:r>
+            <a:r>
+              <a:rPr lang="en-US" sz="2000" dirty="0">
+                <a:latin typeface="Calibri" pitchFamily="34" charset="0"/>
+              </a:rPr>
+              <a:t> correctly identified the start of the chorus each time it occurred, though it missed certain other segments (precision 0.71, recall 0.63). On a cover of “Titanium,” </a:t>
+            </a:r>
+            <a:r>
+              <a:rPr lang="en-US" sz="2000" dirty="0" err="1">
+                <a:latin typeface="Calibri" pitchFamily="34" charset="0"/>
+              </a:rPr>
+              <a:t>Structify</a:t>
+            </a:r>
+            <a:r>
+              <a:rPr lang="en-US" sz="2000" dirty="0">
+                <a:latin typeface="Calibri" pitchFamily="34" charset="0"/>
+              </a:rPr>
+              <a:t> generally segmented the song well, but occasionally halfway through the chorus </a:t>
+            </a:r>
+            <a:r>
+              <a:rPr lang="en-US" sz="2000" dirty="0">
+                <a:latin typeface="Calibri" pitchFamily="34" charset="0"/>
+              </a:rPr>
+              <a:t>(precision 0.71, recall 0.83)</a:t>
+            </a:r>
+            <a:r>
+              <a:rPr lang="en-US" sz="2000" dirty="0">
+                <a:latin typeface="Calibri" pitchFamily="34" charset="0"/>
+              </a:rPr>
+              <a:t>. And on “Firework” by Katy Perry, the segmentations found were generally accurate, but it did not identify all of them, indicating that the algorithm parameters could be better tuned.</a:t>
             </a:r>
           </a:p>
           <a:p>
             <a:pPr eaLnBrk="1" hangingPunct="1"/>
-            <a:r>
-              <a:rPr lang="en-US" sz="2000" b="1" dirty="0">
-                <a:latin typeface="Calibri" pitchFamily="34" charset="0"/>
-              </a:rPr>
-              <a:t>FILLER</a:t>
-            </a:r>
-          </a:p>
-          <a:p>
-            <a:pPr eaLnBrk="1" hangingPunct="1"/>
-            <a:r>
-              <a:rPr lang="en-US" sz="2000" b="1" dirty="0">
-                <a:latin typeface="Calibri" pitchFamily="34" charset="0"/>
-              </a:rPr>
-              <a:t>FILLER</a:t>
-            </a:r>
-          </a:p>
-          <a:p>
-            <a:pPr eaLnBrk="1" hangingPunct="1"/>
-            <a:r>
-              <a:rPr lang="en-US" sz="2000" b="1" dirty="0">
-                <a:latin typeface="Calibri" pitchFamily="34" charset="0"/>
-              </a:rPr>
-              <a:t>FILLER</a:t>
-            </a:r>
-          </a:p>
-          <a:p>
-            <a:pPr eaLnBrk="1" hangingPunct="1"/>
-            <a:r>
-              <a:rPr lang="en-US" sz="2000" b="1" dirty="0">
-                <a:latin typeface="Calibri" pitchFamily="34" charset="0"/>
-              </a:rPr>
-              <a:t>FILLER</a:t>
-            </a:r>
-          </a:p>
-          <a:p>
-            <a:pPr eaLnBrk="1" hangingPunct="1"/>
-            <a:endParaRPr lang="en-US" sz="2000" b="1" dirty="0">
+            <a:endParaRPr lang="en-US" sz="2000" dirty="0">
               <a:latin typeface="Calibri" pitchFamily="34" charset="0"/>
             </a:endParaRPr>
           </a:p>
           <a:p>
             <a:pPr eaLnBrk="1" hangingPunct="1"/>
-            <a:endParaRPr lang="en-US" sz="2000" b="1" dirty="0">
+            <a:r>
+              <a:rPr lang="en-US" sz="2000" dirty="0">
+                <a:latin typeface="Calibri" pitchFamily="34" charset="0"/>
+              </a:rPr>
+              <a:t>Conversely, on “Bohemian Rhapsody,” </a:t>
+            </a:r>
+            <a:r>
+              <a:rPr lang="en-US" sz="2000" dirty="0" err="1">
+                <a:latin typeface="Calibri" pitchFamily="34" charset="0"/>
+              </a:rPr>
+              <a:t>Structify</a:t>
+            </a:r>
+            <a:r>
+              <a:rPr lang="en-US" sz="2000" dirty="0">
+                <a:latin typeface="Calibri" pitchFamily="34" charset="0"/>
+              </a:rPr>
+              <a:t> performed extremely poorly, having precision of 0.2 and recall of 0.25. This can be largely attributed to the failure of beat tracking due to tempo and style changes, since </a:t>
+            </a:r>
+            <a:r>
+              <a:rPr lang="en-US" sz="2000" dirty="0" err="1">
+                <a:latin typeface="Calibri" pitchFamily="34" charset="0"/>
+              </a:rPr>
+              <a:t>Structify</a:t>
+            </a:r>
+            <a:r>
+              <a:rPr lang="en-US" sz="2000" dirty="0">
+                <a:latin typeface="Calibri" pitchFamily="34" charset="0"/>
+              </a:rPr>
+              <a:t> depends on beat tracking to analyze similarity.</a:t>
+            </a:r>
+          </a:p>
+          <a:p>
+            <a:pPr eaLnBrk="1" hangingPunct="1"/>
+            <a:endParaRPr lang="en-US" sz="2000" dirty="0">
               <a:latin typeface="Calibri" pitchFamily="34" charset="0"/>
             </a:endParaRPr>
           </a:p>
@@ -4773,52 +4800,19 @@
               <a:rPr lang="en-US" sz="2000" dirty="0">
                 <a:latin typeface="Calibri" pitchFamily="34" charset="0"/>
               </a:rPr>
-              <a:t> showed extremely promising results, as it was frequently able to identify </a:t>
-            </a:r>
-            <a:r>
-              <a:rPr lang="en-US" sz="2000" b="1" dirty="0">
-                <a:latin typeface="Calibri" pitchFamily="34" charset="0"/>
-              </a:rPr>
-              <a:t>things it was able to do. </a:t>
+              <a:t> showed extremely promising results on highly structured songs, as it was frequently able to identify correct segmentations, and rarely incorrectly segmented songs. However, when beat tracking failed, </a:t>
+            </a:r>
+            <a:r>
+              <a:rPr lang="en-US" sz="2000" dirty="0" err="1">
+                <a:latin typeface="Calibri" pitchFamily="34" charset="0"/>
+              </a:rPr>
+              <a:t>Structify</a:t>
             </a:r>
             <a:r>
               <a:rPr lang="en-US" sz="2000" dirty="0">
                 <a:latin typeface="Calibri" pitchFamily="34" charset="0"/>
               </a:rPr>
-              <a:t>In addition, it correctly </a:t>
-            </a:r>
-            <a:r>
-              <a:rPr lang="en-US" sz="2000" b="1" dirty="0">
-                <a:latin typeface="Calibri" pitchFamily="34" charset="0"/>
-              </a:rPr>
-              <a:t>did another thing. Maybe another line. </a:t>
-            </a:r>
-          </a:p>
-          <a:p>
-            <a:pPr eaLnBrk="1" hangingPunct="1"/>
-            <a:r>
-              <a:rPr lang="en-US" sz="2000" b="1" dirty="0">
-                <a:latin typeface="Calibri" pitchFamily="34" charset="0"/>
-              </a:rPr>
-              <a:t>FILLER</a:t>
-            </a:r>
-          </a:p>
-          <a:p>
-            <a:pPr eaLnBrk="1" hangingPunct="1"/>
-            <a:r>
-              <a:rPr lang="en-US" sz="2000" b="1" dirty="0">
-                <a:latin typeface="Calibri" pitchFamily="34" charset="0"/>
-              </a:rPr>
-              <a:t>FILLER</a:t>
-            </a:r>
-          </a:p>
-          <a:p>
-            <a:pPr eaLnBrk="1" hangingPunct="1"/>
-            <a:r>
-              <a:rPr lang="en-US" sz="2000" dirty="0">
-                <a:latin typeface="Calibri" pitchFamily="34" charset="0"/>
-              </a:rPr>
-              <a:t>While song segmentation is a difficult task, </a:t>
+              <a:t> did not at all work well, since the algorithm revolves around the similarity of beat-synchronous features. While song segmentation is a difficult task, </a:t>
             </a:r>
             <a:r>
               <a:rPr lang="en-US" sz="2000" dirty="0" err="1">
@@ -4845,7 +4839,7 @@
               <a:rPr lang="en-US" sz="2000" dirty="0">
                 <a:latin typeface="Calibri" pitchFamily="34" charset="0"/>
               </a:rPr>
-              <a:t>This project can be taken in several directions. The segmentation pipeline could likely be fine-tuned, as the original authors were able to obtain better results than we were. Other methods of segmentation could also be investigated, such as analysis with spectral clustering</a:t>
+              <a:t>This project can be taken in several directions. The segmentation pipeline could likely be fine-tuned, including varying more parameters, refining beat tracking, or applying filters to the self-similarity matrix.  Other methods of segmentation could also be investigated, such as analysis with spectral clustering</a:t>
             </a:r>
             <a:r>
               <a:rPr lang="en-US" sz="2000" baseline="30000" dirty="0">
@@ -4927,7 +4921,7 @@
           <p:nvPr>
             <p:extLst>
               <p:ext uri="{D42A27DB-BD31-4B8C-83A1-F6EECF244321}">
-                <p14:modId xmlns:p14="http://schemas.microsoft.com/office/powerpoint/2010/main" val="634745182"/>
+                <p14:modId xmlns:p14="http://schemas.microsoft.com/office/powerpoint/2010/main" val="3048956986"/>
               </p:ext>
             </p:extLst>
           </p:nvPr>
@@ -4978,7 +4972,7 @@
                     <a:bodyPr/>
                     <a:lstStyle/>
                     <a:p>
-                      <a:endParaRPr lang="en-US" sz="2400" dirty="0"/>
+                      <a:endParaRPr lang="en-US" sz="2000" dirty="0"/>
                     </a:p>
                   </a:txBody>
                   <a:tcPr marT="22861" marB="22861" anchor="ctr">
@@ -4996,7 +4990,7 @@
                     <a:p>
                       <a:pPr algn="ctr"/>
                       <a:r>
-                        <a:rPr lang="en-US" sz="2400" dirty="0"/>
+                        <a:rPr lang="en-US" sz="2000" dirty="0"/>
                         <a:t>Chroma</a:t>
                       </a:r>
                     </a:p>
@@ -5016,7 +5010,7 @@
                     <a:p>
                       <a:pPr algn="ctr"/>
                       <a:r>
-                        <a:rPr lang="en-US" sz="2400" dirty="0"/>
+                        <a:rPr lang="en-US" sz="2000" dirty="0"/>
                         <a:t>Tempo</a:t>
                       </a:r>
                     </a:p>
@@ -5036,7 +5030,7 @@
                     <a:p>
                       <a:pPr algn="ctr"/>
                       <a:r>
-                        <a:rPr lang="en-US" sz="2400" dirty="0"/>
+                        <a:rPr lang="en-US" sz="2000" dirty="0"/>
                         <a:t>Timbre</a:t>
                       </a:r>
                     </a:p>
@@ -5063,14 +5057,14 @@
                     <a:p>
                       <a:pPr algn="ctr"/>
                       <a:r>
-                        <a:rPr lang="en-US" sz="1800" dirty="0"/>
+                        <a:rPr lang="en-US" sz="2000" dirty="0"/>
                         <a:t>Bohemian</a:t>
                       </a:r>
                       <a:r>
-                        <a:rPr lang="en-US" sz="1800" baseline="0" dirty="0"/>
+                        <a:rPr lang="en-US" sz="2000" baseline="0" dirty="0"/>
                         <a:t> Rhapsody</a:t>
                       </a:r>
-                      <a:endParaRPr lang="en-US" sz="1800" dirty="0"/>
+                      <a:endParaRPr lang="en-US" sz="2000" dirty="0"/>
                     </a:p>
                   </a:txBody>
                   <a:tcPr marT="22861" marB="22861" anchor="ctr"/>
@@ -5082,7 +5076,7 @@
                     <a:p>
                       <a:pPr algn="ctr"/>
                       <a:r>
-                        <a:rPr lang="en-US" sz="1800" dirty="0"/>
+                        <a:rPr lang="en-US" sz="2000" dirty="0"/>
                         <a:t>0.12</a:t>
                       </a:r>
                     </a:p>
@@ -5096,7 +5090,7 @@
                     <a:p>
                       <a:pPr algn="ctr"/>
                       <a:r>
-                        <a:rPr lang="en-US" sz="1800" dirty="0"/>
+                        <a:rPr lang="en-US" sz="2000" dirty="0"/>
                         <a:t>0.22</a:t>
                       </a:r>
                     </a:p>
@@ -5110,7 +5104,7 @@
                     <a:p>
                       <a:pPr algn="ctr"/>
                       <a:r>
-                        <a:rPr lang="en-US" sz="1800" dirty="0"/>
+                        <a:rPr lang="en-US" sz="2000" dirty="0"/>
                         <a:t>0.19</a:t>
                       </a:r>
                     </a:p>
@@ -5131,7 +5125,7 @@
                     <a:p>
                       <a:pPr algn="ctr"/>
                       <a:r>
-                        <a:rPr lang="en-US" sz="1800" dirty="0"/>
+                        <a:rPr lang="en-US" sz="2000" dirty="0"/>
                         <a:t>Call Me Maybe</a:t>
                       </a:r>
                     </a:p>
@@ -5145,7 +5139,7 @@
                     <a:p>
                       <a:pPr algn="ctr"/>
                       <a:r>
-                        <a:rPr lang="en-US" sz="1800" dirty="0"/>
+                        <a:rPr lang="en-US" sz="2000" dirty="0"/>
                         <a:t>0.53</a:t>
                       </a:r>
                     </a:p>
@@ -5159,7 +5153,7 @@
                     <a:p>
                       <a:pPr algn="ctr"/>
                       <a:r>
-                        <a:rPr lang="en-US" sz="1800" dirty="0"/>
+                        <a:rPr lang="en-US" sz="2000" dirty="0"/>
                         <a:t>0.47</a:t>
                       </a:r>
                     </a:p>
@@ -5173,7 +5167,7 @@
                     <a:p>
                       <a:pPr algn="ctr"/>
                       <a:r>
-                        <a:rPr lang="en-US" sz="1800" dirty="0"/>
+                        <a:rPr lang="en-US" sz="2000" dirty="0"/>
                         <a:t>0.66</a:t>
                       </a:r>
                     </a:p>
@@ -5194,7 +5188,7 @@
                     <a:p>
                       <a:pPr algn="ctr"/>
                       <a:r>
-                        <a:rPr lang="en-US" sz="1800" dirty="0"/>
+                        <a:rPr lang="en-US" sz="2000" dirty="0"/>
                         <a:t>Come On Eileen</a:t>
                       </a:r>
                     </a:p>
@@ -5208,7 +5202,7 @@
                     <a:p>
                       <a:pPr algn="ctr"/>
                       <a:r>
-                        <a:rPr lang="en-US" sz="1800" dirty="0"/>
+                        <a:rPr lang="en-US" sz="2000" dirty="0"/>
                         <a:t>0.28</a:t>
                       </a:r>
                     </a:p>
@@ -5222,7 +5216,7 @@
                     <a:p>
                       <a:pPr algn="ctr"/>
                       <a:r>
-                        <a:rPr lang="en-US" sz="1800" dirty="0"/>
+                        <a:rPr lang="en-US" sz="2000" dirty="0"/>
                         <a:t>0.31</a:t>
                       </a:r>
                     </a:p>
@@ -5236,7 +5230,7 @@
                     <a:p>
                       <a:pPr algn="ctr"/>
                       <a:r>
-                        <a:rPr lang="en-US" sz="1800" dirty="0"/>
+                        <a:rPr lang="en-US" sz="2000" dirty="0"/>
                         <a:t>0.38</a:t>
                       </a:r>
                     </a:p>
@@ -5257,7 +5251,7 @@
                     <a:p>
                       <a:pPr algn="ctr"/>
                       <a:r>
-                        <a:rPr lang="en-US" sz="1800" dirty="0"/>
+                        <a:rPr lang="en-US" sz="2000" dirty="0"/>
                         <a:t>Firework</a:t>
                       </a:r>
                     </a:p>
@@ -5271,7 +5265,7 @@
                     <a:p>
                       <a:pPr algn="ctr"/>
                       <a:r>
-                        <a:rPr lang="en-US" sz="1800" dirty="0"/>
+                        <a:rPr lang="en-US" sz="2000" dirty="0"/>
                         <a:t>0.35</a:t>
                       </a:r>
                     </a:p>
@@ -5285,7 +5279,7 @@
                     <a:p>
                       <a:pPr algn="ctr"/>
                       <a:r>
-                        <a:rPr lang="en-US" sz="1800" dirty="0"/>
+                        <a:rPr lang="en-US" sz="2000" dirty="0"/>
                         <a:t>0.53</a:t>
                       </a:r>
                     </a:p>
@@ -5299,7 +5293,7 @@
                     <a:p>
                       <a:pPr algn="ctr"/>
                       <a:r>
-                        <a:rPr lang="en-US" sz="1800" dirty="0"/>
+                        <a:rPr lang="en-US" sz="2000" dirty="0"/>
                         <a:t>0.53</a:t>
                       </a:r>
                     </a:p>
@@ -5320,14 +5314,14 @@
                     <a:p>
                       <a:pPr algn="ctr"/>
                       <a:r>
-                        <a:rPr lang="en-US" sz="1800" dirty="0"/>
+                        <a:rPr lang="en-US" sz="2000" dirty="0"/>
                         <a:t>Happy</a:t>
                       </a:r>
                       <a:r>
-                        <a:rPr lang="en-US" sz="1800" baseline="0" dirty="0"/>
+                        <a:rPr lang="en-US" sz="2000" baseline="0" dirty="0"/>
                         <a:t> Together</a:t>
                       </a:r>
-                      <a:endParaRPr lang="en-US" sz="1800" dirty="0"/>
+                      <a:endParaRPr lang="en-US" sz="2000" dirty="0"/>
                     </a:p>
                   </a:txBody>
                   <a:tcPr marT="22861" marB="22861" anchor="ctr"/>
@@ -5339,7 +5333,7 @@
                     <a:p>
                       <a:pPr algn="ctr"/>
                       <a:r>
-                        <a:rPr lang="en-US" sz="1800" dirty="0"/>
+                        <a:rPr lang="en-US" sz="2000" dirty="0"/>
                         <a:t>0.38</a:t>
                       </a:r>
                     </a:p>
@@ -5353,7 +5347,7 @@
                     <a:p>
                       <a:pPr algn="ctr"/>
                       <a:r>
-                        <a:rPr lang="en-US" sz="1800" dirty="0"/>
+                        <a:rPr lang="en-US" sz="2000" dirty="0"/>
                         <a:t>0.38</a:t>
                       </a:r>
                     </a:p>
@@ -5367,7 +5361,7 @@
                     <a:p>
                       <a:pPr algn="ctr"/>
                       <a:r>
-                        <a:rPr lang="en-US" sz="1800" dirty="0"/>
+                        <a:rPr lang="en-US" sz="2000" dirty="0"/>
                         <a:t>0.25</a:t>
                       </a:r>
                     </a:p>
@@ -5388,7 +5382,7 @@
                     <a:p>
                       <a:pPr algn="ctr"/>
                       <a:r>
-                        <a:rPr lang="en-US" sz="1800" dirty="0"/>
+                        <a:rPr lang="en-US" sz="2000" dirty="0"/>
                         <a:t>Hotel California</a:t>
                       </a:r>
                     </a:p>
@@ -5402,7 +5396,7 @@
                     <a:p>
                       <a:pPr algn="ctr"/>
                       <a:r>
-                        <a:rPr lang="en-US" sz="1800" dirty="0"/>
+                        <a:rPr lang="en-US" sz="2000" dirty="0"/>
                         <a:t>0.44</a:t>
                       </a:r>
                     </a:p>
@@ -5416,7 +5410,7 @@
                     <a:p>
                       <a:pPr algn="ctr"/>
                       <a:r>
-                        <a:rPr lang="en-US" sz="1800" dirty="0"/>
+                        <a:rPr lang="en-US" sz="2000" dirty="0"/>
                         <a:t>0.14</a:t>
                       </a:r>
                     </a:p>
@@ -5430,7 +5424,7 @@
                     <a:p>
                       <a:pPr algn="ctr"/>
                       <a:r>
-                        <a:rPr lang="en-US" sz="1800" dirty="0"/>
+                        <a:rPr lang="en-US" sz="2000" dirty="0"/>
                         <a:t>0.38</a:t>
                       </a:r>
                     </a:p>
@@ -5451,14 +5445,14 @@
                     <a:p>
                       <a:pPr algn="ctr"/>
                       <a:r>
-                        <a:rPr lang="en-US" sz="1800" dirty="0"/>
+                        <a:rPr lang="en-US" sz="2000" dirty="0"/>
                         <a:t>Raspberry</a:t>
                       </a:r>
                       <a:r>
-                        <a:rPr lang="en-US" sz="1800" baseline="0" dirty="0"/>
+                        <a:rPr lang="en-US" sz="2000" baseline="0" dirty="0"/>
                         <a:t> Beret</a:t>
                       </a:r>
-                      <a:endParaRPr lang="en-US" sz="1800" dirty="0"/>
+                      <a:endParaRPr lang="en-US" sz="2000" dirty="0"/>
                     </a:p>
                   </a:txBody>
                   <a:tcPr marT="22861" marB="22861" anchor="ctr"/>
@@ -5470,7 +5464,7 @@
                     <a:p>
                       <a:pPr algn="ctr"/>
                       <a:r>
-                        <a:rPr lang="en-US" sz="1800" dirty="0"/>
+                        <a:rPr lang="en-US" sz="2000" dirty="0"/>
                         <a:t>0.36</a:t>
                       </a:r>
                     </a:p>
@@ -5484,7 +5478,7 @@
                     <a:p>
                       <a:pPr algn="ctr"/>
                       <a:r>
-                        <a:rPr lang="en-US" sz="1800" dirty="0"/>
+                        <a:rPr lang="en-US" sz="2000" dirty="0"/>
                         <a:t>0.53</a:t>
                       </a:r>
                     </a:p>
@@ -5498,7 +5492,7 @@
                     <a:p>
                       <a:pPr algn="ctr"/>
                       <a:r>
-                        <a:rPr lang="en-US" sz="1800" dirty="0"/>
+                        <a:rPr lang="en-US" sz="2000" dirty="0"/>
                         <a:t>0.50</a:t>
                       </a:r>
                     </a:p>
@@ -5519,7 +5513,7 @@
                     <a:p>
                       <a:pPr algn="ctr"/>
                       <a:r>
-                        <a:rPr lang="en-US" sz="1800" dirty="0"/>
+                        <a:rPr lang="en-US" sz="2000" dirty="0"/>
                         <a:t>Rolling in the Deep</a:t>
                       </a:r>
                     </a:p>
@@ -5533,7 +5527,7 @@
                     <a:p>
                       <a:pPr algn="ctr"/>
                       <a:r>
-                        <a:rPr lang="en-US" sz="1800" dirty="0"/>
+                        <a:rPr lang="en-US" sz="2000" dirty="0"/>
                         <a:t>0.47</a:t>
                       </a:r>
                     </a:p>
@@ -5547,7 +5541,7 @@
                     <a:p>
                       <a:pPr algn="ctr"/>
                       <a:r>
-                        <a:rPr lang="en-US" sz="1800" dirty="0"/>
+                        <a:rPr lang="en-US" sz="2000" dirty="0"/>
                         <a:t>0.31</a:t>
                       </a:r>
                     </a:p>
@@ -5561,7 +5555,7 @@
                     <a:p>
                       <a:pPr algn="ctr"/>
                       <a:r>
-                        <a:rPr lang="en-US" sz="1800" dirty="0"/>
+                        <a:rPr lang="en-US" sz="2000" dirty="0"/>
                         <a:t>0.43</a:t>
                       </a:r>
                     </a:p>
@@ -5582,7 +5576,7 @@
                     <a:p>
                       <a:pPr algn="ctr"/>
                       <a:r>
-                        <a:rPr lang="en-US" sz="1800" dirty="0"/>
+                        <a:rPr lang="en-US" sz="2000" dirty="0"/>
                         <a:t>Titanium</a:t>
                       </a:r>
                     </a:p>
@@ -5596,7 +5590,7 @@
                     <a:p>
                       <a:pPr algn="ctr"/>
                       <a:r>
-                        <a:rPr lang="en-US" sz="1800" dirty="0"/>
+                        <a:rPr lang="en-US" sz="2000" dirty="0"/>
                         <a:t>0.25</a:t>
                       </a:r>
                     </a:p>
@@ -5610,7 +5604,7 @@
                     <a:p>
                       <a:pPr algn="ctr"/>
                       <a:r>
-                        <a:rPr lang="en-US" sz="1800" dirty="0"/>
+                        <a:rPr lang="en-US" sz="2000" dirty="0"/>
                         <a:t>0.33</a:t>
                       </a:r>
                     </a:p>
@@ -5624,7 +5618,7 @@
                     <a:p>
                       <a:pPr algn="ctr"/>
                       <a:r>
-                        <a:rPr lang="en-US" sz="1800" dirty="0"/>
+                        <a:rPr lang="en-US" sz="2000" dirty="0"/>
                         <a:t>0.78</a:t>
                       </a:r>
                     </a:p>
@@ -5645,7 +5639,7 @@
                     <a:p>
                       <a:pPr algn="ctr"/>
                       <a:r>
-                        <a:rPr lang="en-US" sz="1800" dirty="0"/>
+                        <a:rPr lang="en-US" sz="2000" dirty="0"/>
                         <a:t>When Doves Cry</a:t>
                       </a:r>
                     </a:p>
@@ -5659,7 +5653,7 @@
                     <a:p>
                       <a:pPr algn="ctr"/>
                       <a:r>
-                        <a:rPr lang="en-US" sz="1800" dirty="0"/>
+                        <a:rPr lang="en-US" sz="2000" dirty="0"/>
                         <a:t>0.36</a:t>
                       </a:r>
                     </a:p>
@@ -5673,7 +5667,7 @@
                     <a:p>
                       <a:pPr algn="ctr"/>
                       <a:r>
-                        <a:rPr lang="en-US" sz="1800" dirty="0"/>
+                        <a:rPr lang="en-US" sz="2000" dirty="0"/>
                         <a:t>0.20</a:t>
                       </a:r>
                     </a:p>
@@ -5687,7 +5681,7 @@
                     <a:p>
                       <a:pPr algn="ctr"/>
                       <a:r>
-                        <a:rPr lang="en-US" sz="1800" dirty="0"/>
+                        <a:rPr lang="en-US" sz="2000" dirty="0"/>
                         <a:t>0.27</a:t>
                       </a:r>
                     </a:p>
@@ -5708,7 +5702,7 @@
                     <a:p>
                       <a:pPr algn="ctr"/>
                       <a:r>
-                        <a:rPr lang="en-US" sz="1800" b="1" dirty="0"/>
+                        <a:rPr lang="en-US" sz="2000" b="1" dirty="0"/>
                         <a:t>Average</a:t>
                       </a:r>
                     </a:p>
@@ -5722,7 +5716,7 @@
                     <a:p>
                       <a:pPr algn="ctr"/>
                       <a:r>
-                        <a:rPr lang="en-US" sz="1800" b="1" dirty="0"/>
+                        <a:rPr lang="en-US" sz="2000" b="1" dirty="0"/>
                         <a:t>0.35</a:t>
                       </a:r>
                     </a:p>
@@ -5736,7 +5730,7 @@
                     <a:p>
                       <a:pPr algn="ctr"/>
                       <a:r>
-                        <a:rPr lang="en-US" sz="1800" b="1" dirty="0"/>
+                        <a:rPr lang="en-US" sz="2000" b="1" dirty="0"/>
                         <a:t>0.34</a:t>
                       </a:r>
                     </a:p>
@@ -5750,7 +5744,7 @@
                     <a:p>
                       <a:pPr algn="ctr"/>
                       <a:r>
-                        <a:rPr lang="en-US" sz="1800" b="1" dirty="0"/>
+                        <a:rPr lang="en-US" sz="2000" b="1" dirty="0"/>
                         <a:t>0.44</a:t>
                       </a:r>
                     </a:p>
@@ -6664,8 +6658,8 @@
         </p:nvSpPr>
         <p:spPr bwMode="auto">
           <a:xfrm>
-            <a:off x="23391974" y="14193663"/>
-            <a:ext cx="7241367" cy="295671"/>
+            <a:off x="23314302" y="14193663"/>
+            <a:ext cx="7396730" cy="295671"/>
           </a:xfrm>
           <a:prstGeom prst="rect">
             <a:avLst/>
@@ -6812,7 +6806,13 @@
               <a:rPr lang="en-US" sz="1600" b="1" dirty="0">
                 <a:latin typeface="Calibri" pitchFamily="34" charset="0"/>
               </a:rPr>
-              <a:t>Figure 3a, b: </a:t>
+              <a:t>Figure 3:</a:t>
+            </a:r>
+            <a:r>
+              <a:rPr lang="en-US" sz="1600" dirty="0">
+                <a:latin typeface="Calibri" pitchFamily="34" charset="0"/>
+              </a:rPr>
+              <a:t> Segmentations of “Call Me Maybe” using </a:t>
             </a:r>
             <a:r>
               <a:rPr lang="en-US" sz="1600" dirty="0" err="1">
@@ -6824,7 +6824,7 @@
               <a:rPr lang="en-US" sz="1600" dirty="0">
                 <a:latin typeface="Calibri" pitchFamily="34" charset="0"/>
               </a:rPr>
-              <a:t> (top) and manual (bottom) segmentations of “Call Me Maybe”</a:t>
+              <a:t> (top) and manually (bottom)</a:t>
             </a:r>
           </a:p>
         </p:txBody>

</xml_diff>